<commit_message>
added/omitted points to make presentative cohesive
</commit_message>
<xml_diff>
--- a/IG_Content_Generator_Slides.pptx
+++ b/IG_Content_Generator_Slides.pptx
@@ -23,10 +23,9 @@
     <p:sldId id="271" r:id="rId17"/>
     <p:sldId id="272" r:id="rId18"/>
     <p:sldId id="273" r:id="rId19"/>
-    <p:sldId id="274" r:id="rId20"/>
   </p:sldIdLst>
   <p:notesMasterIdLst>
-    <p:notesMasterId r:id="rId25"/>
+    <p:notesMasterId r:id="rId24"/>
   </p:notesMasterIdLst>
   <p:sldSz cx="9144000" cy="5143500" type="screen16x9"/>
   <p:notesSz cx="5143500" cy="9144000"/>
@@ -1337,94 +1336,6 @@
             <a:fld id="{F7021451-1387-4CA6-816F-3879F97B5CBC}" type="slidenum">
               <a:rPr lang="en-US" smtClean="0"/>
               <a:t>18</a:t>
-            </a:fld>
-            <a:endParaRPr lang="en-US"/>
-          </a:p>
-        </p:txBody>
-      </p:sp>
-    </p:spTree>
-    <p:extLst>
-      <p:ext uri="{BB962C8B-B14F-4D97-AF65-F5344CB8AC3E}">
-        <p14:creationId xmlns:p14="http://schemas.microsoft.com/office/powerpoint/2010/main" val="1024086991"/>
-      </p:ext>
-    </p:extLst>
-  </p:cSld>
-  <p:clrMapOvr>
-    <a:masterClrMapping/>
-  </p:clrMapOvr>
-</p:notes>
-</file>
-
-<file path=ppt/notesSlides/notesSlide19.xml><?xml version="1.0" encoding="utf-8"?>
-<p:notes xmlns:a="http://schemas.openxmlformats.org/drawingml/2006/main" xmlns:r="http://schemas.openxmlformats.org/officeDocument/2006/relationships" xmlns:p="http://schemas.openxmlformats.org/presentationml/2006/main">
-  <p:cSld>
-    <p:spTree>
-      <p:nvGrpSpPr>
-        <p:cNvPr id="1" name=""/>
-        <p:cNvGrpSpPr/>
-        <p:nvPr/>
-      </p:nvGrpSpPr>
-      <p:grpSpPr>
-        <a:xfrm>
-          <a:off x="0" y="0"/>
-          <a:ext cx="0" cy="0"/>
-          <a:chOff x="0" y="0"/>
-          <a:chExt cx="0" cy="0"/>
-        </a:xfrm>
-      </p:grpSpPr>
-      <p:sp>
-        <p:nvSpPr>
-          <p:cNvPr id="2" name="Slide Image Placeholder 1"/>
-          <p:cNvSpPr>
-            <a:spLocks noGrp="1" noRot="1" noChangeAspect="1"/>
-          </p:cNvSpPr>
-          <p:nvPr>
-            <p:ph type="sldImg"/>
-          </p:nvPr>
-        </p:nvSpPr>
-        <p:spPr/>
-      </p:sp>
-      <p:sp>
-        <p:nvSpPr>
-          <p:cNvPr id="3" name="Notes Placeholder 2"/>
-          <p:cNvSpPr>
-            <a:spLocks noGrp="1"/>
-          </p:cNvSpPr>
-          <p:nvPr>
-            <p:ph type="body" idx="1"/>
-          </p:nvPr>
-        </p:nvSpPr>
-        <p:spPr/>
-        <p:txBody>
-          <a:bodyPr/>
-          <a:lstStyle/>
-          <a:p>
-            <a:r>
-              <a:rPr lang="en-US" dirty="0" smtClean="0"/>
-              <a:t/>
-            </a:r>
-            <a:endParaRPr lang="en-US" dirty="0"/>
-          </a:p>
-        </p:txBody>
-      </p:sp>
-      <p:sp>
-        <p:nvSpPr>
-          <p:cNvPr id="4" name="Slide Number Placeholder 3"/>
-          <p:cNvSpPr>
-            <a:spLocks noGrp="1"/>
-          </p:cNvSpPr>
-          <p:nvPr>
-            <p:ph type="sldNum" sz="quarter" idx="10"/>
-          </p:nvPr>
-        </p:nvSpPr>
-        <p:spPr/>
-        <p:txBody>
-          <a:bodyPr/>
-          <a:lstStyle/>
-          <a:p>
-            <a:fld id="{F7021451-1387-4CA6-816F-3879F97B5CBC}" type="slidenum">
-              <a:rPr lang="en-US" smtClean="0"/>
-              <a:t>19</a:t>
             </a:fld>
             <a:endParaRPr lang="en-US"/>
           </a:p>
@@ -2516,54 +2427,6 @@
       </p:grpSpPr>
       <p:pic>
         <p:nvPicPr>
-          <p:cNvPr id="2" name="Object 1" descr="/tmp/-M4gO2fgJOOsXuNKNYb5.pptx">    </p:cNvPr>
-          <p:cNvPicPr>
-            <a:picLocks noChangeAspect="1"/>
-          </p:cNvPicPr>
-          <p:nvPr/>
-        </p:nvPicPr>
-        <p:blipFill>
-          <a:blip r:embed="rId1"/>
-          <a:srcRect l="0" r="0" t="0" b="0"/>
-          <a:stretch/>
-        </p:blipFill>
-        <p:spPr>
-          <a:xfrm>
-            <a:off x="0" y="0"/>
-            <a:ext cx="9144000" cy="5143500"/>
-          </a:xfrm>
-          <a:prstGeom prst="rect">
-            <a:avLst/>
-          </a:prstGeom>
-        </p:spPr>
-      </p:pic>
-    </p:spTree>
-  </p:cSld>
-  <p:clrMapOvr>
-    <a:masterClrMapping/>
-  </p:clrMapOvr>
-</p:sld>
-</file>
-
-<file path=ppt/slides/slide11.xml><?xml version="1.0" encoding="utf-8"?>
-<p:sld xmlns:a="http://schemas.openxmlformats.org/drawingml/2006/main" xmlns:r="http://schemas.openxmlformats.org/officeDocument/2006/relationships" xmlns:p="http://schemas.openxmlformats.org/presentationml/2006/main">
-  <p:cSld name="Slide 11">
-    <p:spTree>
-      <p:nvGrpSpPr>
-        <p:cNvPr id="1" name=""/>
-        <p:cNvGrpSpPr/>
-        <p:nvPr/>
-      </p:nvGrpSpPr>
-      <p:grpSpPr>
-        <a:xfrm>
-          <a:off x="0" y="0"/>
-          <a:ext cx="0" cy="0"/>
-          <a:chOff x="0" y="0"/>
-          <a:chExt cx="0" cy="0"/>
-        </a:xfrm>
-      </p:grpSpPr>
-      <p:pic>
-        <p:nvPicPr>
           <p:cNvPr id="2" name="Object 1" descr="/tmp/-M3Je4Rhv-N73PsokycN.pptx">    </p:cNvPr>
           <p:cNvPicPr>
             <a:picLocks noChangeAspect="1"/>
@@ -2593,9 +2456,9 @@
 </p:sld>
 </file>
 
-<file path=ppt/slides/slide12.xml><?xml version="1.0" encoding="utf-8"?>
+<file path=ppt/slides/slide11.xml><?xml version="1.0" encoding="utf-8"?>
 <p:sld xmlns:a="http://schemas.openxmlformats.org/drawingml/2006/main" xmlns:r="http://schemas.openxmlformats.org/officeDocument/2006/relationships" xmlns:p="http://schemas.openxmlformats.org/presentationml/2006/main">
-  <p:cSld name="Slide 12">
+  <p:cSld name="Slide 11">
     <p:spTree>
       <p:nvGrpSpPr>
         <p:cNvPr id="1" name=""/>
@@ -2641,9 +2504,9 @@
 </p:sld>
 </file>
 
-<file path=ppt/slides/slide13.xml><?xml version="1.0" encoding="utf-8"?>
+<file path=ppt/slides/slide12.xml><?xml version="1.0" encoding="utf-8"?>
 <p:sld xmlns:a="http://schemas.openxmlformats.org/drawingml/2006/main" xmlns:r="http://schemas.openxmlformats.org/officeDocument/2006/relationships" xmlns:p="http://schemas.openxmlformats.org/presentationml/2006/main">
-  <p:cSld name="Slide 13">
+  <p:cSld name="Slide 12">
     <p:spTree>
       <p:nvGrpSpPr>
         <p:cNvPr id="1" name=""/>
@@ -2689,9 +2552,9 @@
 </p:sld>
 </file>
 
-<file path=ppt/slides/slide14.xml><?xml version="1.0" encoding="utf-8"?>
+<file path=ppt/slides/slide13.xml><?xml version="1.0" encoding="utf-8"?>
 <p:sld xmlns:a="http://schemas.openxmlformats.org/drawingml/2006/main" xmlns:r="http://schemas.openxmlformats.org/officeDocument/2006/relationships" xmlns:p="http://schemas.openxmlformats.org/presentationml/2006/main">
-  <p:cSld name="Slide 14">
+  <p:cSld name="Slide 13">
     <p:spTree>
       <p:nvGrpSpPr>
         <p:cNvPr id="1" name=""/>
@@ -2737,9 +2600,9 @@
 </p:sld>
 </file>
 
-<file path=ppt/slides/slide15.xml><?xml version="1.0" encoding="utf-8"?>
+<file path=ppt/slides/slide14.xml><?xml version="1.0" encoding="utf-8"?>
 <p:sld xmlns:a="http://schemas.openxmlformats.org/drawingml/2006/main" xmlns:r="http://schemas.openxmlformats.org/officeDocument/2006/relationships" xmlns:p="http://schemas.openxmlformats.org/presentationml/2006/main">
-  <p:cSld name="Slide 15">
+  <p:cSld name="Slide 14">
     <p:spTree>
       <p:nvGrpSpPr>
         <p:cNvPr id="1" name=""/>
@@ -2785,9 +2648,9 @@
 </p:sld>
 </file>
 
-<file path=ppt/slides/slide16.xml><?xml version="1.0" encoding="utf-8"?>
+<file path=ppt/slides/slide15.xml><?xml version="1.0" encoding="utf-8"?>
 <p:sld xmlns:a="http://schemas.openxmlformats.org/drawingml/2006/main" xmlns:r="http://schemas.openxmlformats.org/officeDocument/2006/relationships" xmlns:p="http://schemas.openxmlformats.org/presentationml/2006/main">
-  <p:cSld name="Slide 16">
+  <p:cSld name="Slide 15">
     <p:spTree>
       <p:nvGrpSpPr>
         <p:cNvPr id="1" name=""/>
@@ -2833,9 +2696,9 @@
 </p:sld>
 </file>
 
-<file path=ppt/slides/slide17.xml><?xml version="1.0" encoding="utf-8"?>
+<file path=ppt/slides/slide16.xml><?xml version="1.0" encoding="utf-8"?>
 <p:sld xmlns:a="http://schemas.openxmlformats.org/drawingml/2006/main" xmlns:r="http://schemas.openxmlformats.org/officeDocument/2006/relationships" xmlns:p="http://schemas.openxmlformats.org/presentationml/2006/main">
-  <p:cSld name="Slide 17">
+  <p:cSld name="Slide 16">
     <p:spTree>
       <p:nvGrpSpPr>
         <p:cNvPr id="1" name=""/>
@@ -2881,9 +2744,9 @@
 </p:sld>
 </file>
 
-<file path=ppt/slides/slide18.xml><?xml version="1.0" encoding="utf-8"?>
+<file path=ppt/slides/slide17.xml><?xml version="1.0" encoding="utf-8"?>
 <p:sld xmlns:a="http://schemas.openxmlformats.org/drawingml/2006/main" xmlns:r="http://schemas.openxmlformats.org/officeDocument/2006/relationships" xmlns:p="http://schemas.openxmlformats.org/presentationml/2006/main">
-  <p:cSld name="Slide 18">
+  <p:cSld name="Slide 17">
     <p:spTree>
       <p:nvGrpSpPr>
         <p:cNvPr id="1" name=""/>
@@ -2929,9 +2792,9 @@
 </p:sld>
 </file>
 
-<file path=ppt/slides/slide19.xml><?xml version="1.0" encoding="utf-8"?>
+<file path=ppt/slides/slide18.xml><?xml version="1.0" encoding="utf-8"?>
 <p:sld xmlns:a="http://schemas.openxmlformats.org/drawingml/2006/main" xmlns:r="http://schemas.openxmlformats.org/officeDocument/2006/relationships" xmlns:p="http://schemas.openxmlformats.org/presentationml/2006/main">
-  <p:cSld name="Slide 19">
+  <p:cSld name="Slide 18">
     <p:spTree>
       <p:nvGrpSpPr>
         <p:cNvPr id="1" name=""/>
@@ -3188,54 +3051,6 @@
       </p:grpSpPr>
       <p:pic>
         <p:nvPicPr>
-          <p:cNvPr id="2" name="Object 1" descr="/tmp/-M3JPdGhuRSXmQ9mGIGF.pptx">    </p:cNvPr>
-          <p:cNvPicPr>
-            <a:picLocks noChangeAspect="1"/>
-          </p:cNvPicPr>
-          <p:nvPr/>
-        </p:nvPicPr>
-        <p:blipFill>
-          <a:blip r:embed="rId1"/>
-          <a:srcRect l="0" r="0" t="0" b="0"/>
-          <a:stretch/>
-        </p:blipFill>
-        <p:spPr>
-          <a:xfrm>
-            <a:off x="0" y="0"/>
-            <a:ext cx="9144000" cy="5143500"/>
-          </a:xfrm>
-          <a:prstGeom prst="rect">
-            <a:avLst/>
-          </a:prstGeom>
-        </p:spPr>
-      </p:pic>
-    </p:spTree>
-  </p:cSld>
-  <p:clrMapOvr>
-    <a:masterClrMapping/>
-  </p:clrMapOvr>
-</p:sld>
-</file>
-
-<file path=ppt/slides/slide7.xml><?xml version="1.0" encoding="utf-8"?>
-<p:sld xmlns:a="http://schemas.openxmlformats.org/drawingml/2006/main" xmlns:r="http://schemas.openxmlformats.org/officeDocument/2006/relationships" xmlns:p="http://schemas.openxmlformats.org/presentationml/2006/main">
-  <p:cSld name="Slide 7">
-    <p:spTree>
-      <p:nvGrpSpPr>
-        <p:cNvPr id="1" name=""/>
-        <p:cNvGrpSpPr/>
-        <p:nvPr/>
-      </p:nvGrpSpPr>
-      <p:grpSpPr>
-        <a:xfrm>
-          <a:off x="0" y="0"/>
-          <a:ext cx="0" cy="0"/>
-          <a:chOff x="0" y="0"/>
-          <a:chExt cx="0" cy="0"/>
-        </a:xfrm>
-      </p:grpSpPr>
-      <p:pic>
-        <p:nvPicPr>
           <p:cNvPr id="2" name="Object 1" descr="/tmp/-M3JSccSR_Pw4yxrqEI2.pptx">    </p:cNvPr>
           <p:cNvPicPr>
             <a:picLocks noChangeAspect="1"/>
@@ -3265,9 +3080,9 @@
 </p:sld>
 </file>
 
-<file path=ppt/slides/slide8.xml><?xml version="1.0" encoding="utf-8"?>
+<file path=ppt/slides/slide7.xml><?xml version="1.0" encoding="utf-8"?>
 <p:sld xmlns:a="http://schemas.openxmlformats.org/drawingml/2006/main" xmlns:r="http://schemas.openxmlformats.org/officeDocument/2006/relationships" xmlns:p="http://schemas.openxmlformats.org/presentationml/2006/main">
-  <p:cSld name="Slide 8">
+  <p:cSld name="Slide 7">
     <p:spTree>
       <p:nvGrpSpPr>
         <p:cNvPr id="1" name=""/>
@@ -3313,6 +3128,54 @@
 </p:sld>
 </file>
 
+<file path=ppt/slides/slide8.xml><?xml version="1.0" encoding="utf-8"?>
+<p:sld xmlns:a="http://schemas.openxmlformats.org/drawingml/2006/main" xmlns:r="http://schemas.openxmlformats.org/officeDocument/2006/relationships" xmlns:p="http://schemas.openxmlformats.org/presentationml/2006/main">
+  <p:cSld name="Slide 8">
+    <p:spTree>
+      <p:nvGrpSpPr>
+        <p:cNvPr id="1" name=""/>
+        <p:cNvGrpSpPr/>
+        <p:nvPr/>
+      </p:nvGrpSpPr>
+      <p:grpSpPr>
+        <a:xfrm>
+          <a:off x="0" y="0"/>
+          <a:ext cx="0" cy="0"/>
+          <a:chOff x="0" y="0"/>
+          <a:chExt cx="0" cy="0"/>
+        </a:xfrm>
+      </p:grpSpPr>
+      <p:pic>
+        <p:nvPicPr>
+          <p:cNvPr id="2" name="Object 1" descr="/tmp/-M3Jd2dEYs1ywpw2xygd.pptx">    </p:cNvPr>
+          <p:cNvPicPr>
+            <a:picLocks noChangeAspect="1"/>
+          </p:cNvPicPr>
+          <p:nvPr/>
+        </p:nvPicPr>
+        <p:blipFill>
+          <a:blip r:embed="rId1"/>
+          <a:srcRect l="0" r="0" t="0" b="0"/>
+          <a:stretch/>
+        </p:blipFill>
+        <p:spPr>
+          <a:xfrm>
+            <a:off x="0" y="0"/>
+            <a:ext cx="9144000" cy="5143500"/>
+          </a:xfrm>
+          <a:prstGeom prst="rect">
+            <a:avLst/>
+          </a:prstGeom>
+        </p:spPr>
+      </p:pic>
+    </p:spTree>
+  </p:cSld>
+  <p:clrMapOvr>
+    <a:masterClrMapping/>
+  </p:clrMapOvr>
+</p:sld>
+</file>
+
 <file path=ppt/slides/slide9.xml><?xml version="1.0" encoding="utf-8"?>
 <p:sld xmlns:a="http://schemas.openxmlformats.org/drawingml/2006/main" xmlns:r="http://schemas.openxmlformats.org/officeDocument/2006/relationships" xmlns:p="http://schemas.openxmlformats.org/presentationml/2006/main">
   <p:cSld name="Slide 9">
@@ -3332,7 +3195,7 @@
       </p:grpSpPr>
       <p:pic>
         <p:nvPicPr>
-          <p:cNvPr id="2" name="Object 1" descr="/tmp/-M3Jd2dEYs1ywpw2xygd.pptx">    </p:cNvPr>
+          <p:cNvPr id="2" name="Object 1" descr="/tmp/-M4gO2fgJOOsXuNKNYb5.pptx">    </p:cNvPr>
           <p:cNvPicPr>
             <a:picLocks noChangeAspect="1"/>
           </p:cNvPicPr>

</xml_diff>